<commit_message>
Updated images to reflect text, added git restore
</commit_message>
<xml_diff>
--- a/Basics/GitGud.pptx
+++ b/Basics/GitGud.pptx
@@ -286,6 +286,11 @@
       </a:defRPr>
     </a:lvl9pPr>
   </p:defaultTextStyle>
+  <p:extLst>
+    <p:ext uri="{EFAFB233-063F-42B5-8137-9DF3F51BA10A}">
+      <p15:sldGuideLst xmlns:p15="http://schemas.microsoft.com/office/powerpoint/2012/main"/>
+    </p:ext>
+  </p:extLst>
 </p:presentation>
 </file>
 
@@ -11571,7 +11576,7 @@
                 <a:cs typeface="Space Mono"/>
                 <a:sym typeface="Space Mono"/>
               </a:rPr>
-              <a:t>Commit</a:t>
+              <a:t>Restore</a:t>
             </a:r>
             <a:endParaRPr sz="2000" b="1" dirty="0">
               <a:solidFill>
@@ -11594,6 +11599,128 @@
         <p:spPr>
           <a:xfrm>
             <a:off x="4676400" y="2562052"/>
+            <a:ext cx="1769400" cy="415200"/>
+          </a:xfrm>
+          <a:prstGeom prst="rect">
+            <a:avLst/>
+          </a:prstGeom>
+          <a:noFill/>
+          <a:ln>
+            <a:noFill/>
+          </a:ln>
+        </p:spPr>
+        <p:txBody>
+          <a:bodyPr spcFirstLastPara="1" wrap="square" lIns="0" tIns="0" rIns="0" bIns="0" anchor="t" anchorCtr="0">
+            <a:noAutofit/>
+          </a:bodyPr>
+          <a:lstStyle/>
+          <a:p>
+            <a:pPr marL="0" lvl="0" indent="0" algn="ctr" rtl="0">
+              <a:lnSpc>
+                <a:spcPct val="90000"/>
+              </a:lnSpc>
+              <a:spcBef>
+                <a:spcPts val="0"/>
+              </a:spcBef>
+              <a:spcAft>
+                <a:spcPts val="0"/>
+              </a:spcAft>
+              <a:buNone/>
+            </a:pPr>
+            <a:r>
+              <a:rPr lang="en" dirty="0">
+                <a:solidFill>
+                  <a:srgbClr val="141414"/>
+                </a:solidFill>
+                <a:latin typeface="Quicksand Medium"/>
+                <a:ea typeface="Quicksand Medium"/>
+                <a:cs typeface="Quicksand Medium"/>
+                <a:sym typeface="Quicksand Medium"/>
+              </a:rPr>
+              <a:t>Removes files from the staging area</a:t>
+            </a:r>
+            <a:endParaRPr dirty="0">
+              <a:solidFill>
+                <a:srgbClr val="141414"/>
+              </a:solidFill>
+              <a:latin typeface="Quicksand Medium"/>
+              <a:ea typeface="Quicksand Medium"/>
+              <a:cs typeface="Quicksand Medium"/>
+              <a:sym typeface="Quicksand Medium"/>
+            </a:endParaRPr>
+          </a:p>
+        </p:txBody>
+      </p:sp>
+      <p:sp>
+        <p:nvSpPr>
+          <p:cNvPr id="242" name="Google Shape;242;p33"/>
+          <p:cNvSpPr txBox="1"/>
+          <p:nvPr/>
+        </p:nvSpPr>
+        <p:spPr>
+          <a:xfrm>
+            <a:off x="6654600" y="2158652"/>
+            <a:ext cx="1769400" cy="318600"/>
+          </a:xfrm>
+          <a:prstGeom prst="rect">
+            <a:avLst/>
+          </a:prstGeom>
+          <a:noFill/>
+          <a:ln>
+            <a:noFill/>
+          </a:ln>
+        </p:spPr>
+        <p:txBody>
+          <a:bodyPr spcFirstLastPara="1" wrap="square" lIns="0" tIns="0" rIns="0" bIns="0" anchor="b" anchorCtr="0">
+            <a:noAutofit/>
+          </a:bodyPr>
+          <a:lstStyle/>
+          <a:p>
+            <a:pPr marL="0" lvl="0" indent="0" algn="ctr" rtl="0">
+              <a:lnSpc>
+                <a:spcPct val="75000"/>
+              </a:lnSpc>
+              <a:spcBef>
+                <a:spcPts val="0"/>
+              </a:spcBef>
+              <a:spcAft>
+                <a:spcPts val="200"/>
+              </a:spcAft>
+              <a:buNone/>
+            </a:pPr>
+            <a:r>
+              <a:rPr lang="en" sz="2000" b="1" dirty="0">
+                <a:solidFill>
+                  <a:srgbClr val="141414"/>
+                </a:solidFill>
+                <a:latin typeface="Space Mono"/>
+                <a:ea typeface="Space Mono"/>
+                <a:cs typeface="Space Mono"/>
+                <a:sym typeface="Space Mono"/>
+              </a:rPr>
+              <a:t>Commit</a:t>
+            </a:r>
+            <a:endParaRPr sz="2000" b="1" dirty="0">
+              <a:solidFill>
+                <a:srgbClr val="141414"/>
+              </a:solidFill>
+              <a:latin typeface="Space Mono"/>
+              <a:ea typeface="Space Mono"/>
+              <a:cs typeface="Space Mono"/>
+              <a:sym typeface="Space Mono"/>
+            </a:endParaRPr>
+          </a:p>
+        </p:txBody>
+      </p:sp>
+      <p:sp>
+        <p:nvSpPr>
+          <p:cNvPr id="243" name="Google Shape;243;p33"/>
+          <p:cNvSpPr txBox="1"/>
+          <p:nvPr/>
+        </p:nvSpPr>
+        <p:spPr>
+          <a:xfrm>
+            <a:off x="6654600" y="2562052"/>
             <a:ext cx="1769400" cy="415200"/>
           </a:xfrm>
           <a:prstGeom prst="rect">
@@ -11648,128 +11775,6 @@
       </p:sp>
       <p:sp>
         <p:nvSpPr>
-          <p:cNvPr id="242" name="Google Shape;242;p33"/>
-          <p:cNvSpPr txBox="1"/>
-          <p:nvPr/>
-        </p:nvSpPr>
-        <p:spPr>
-          <a:xfrm>
-            <a:off x="6654600" y="2158652"/>
-            <a:ext cx="1769400" cy="318600"/>
-          </a:xfrm>
-          <a:prstGeom prst="rect">
-            <a:avLst/>
-          </a:prstGeom>
-          <a:noFill/>
-          <a:ln>
-            <a:noFill/>
-          </a:ln>
-        </p:spPr>
-        <p:txBody>
-          <a:bodyPr spcFirstLastPara="1" wrap="square" lIns="0" tIns="0" rIns="0" bIns="0" anchor="b" anchorCtr="0">
-            <a:noAutofit/>
-          </a:bodyPr>
-          <a:lstStyle/>
-          <a:p>
-            <a:pPr marL="0" lvl="0" indent="0" algn="ctr" rtl="0">
-              <a:lnSpc>
-                <a:spcPct val="75000"/>
-              </a:lnSpc>
-              <a:spcBef>
-                <a:spcPts val="0"/>
-              </a:spcBef>
-              <a:spcAft>
-                <a:spcPts val="200"/>
-              </a:spcAft>
-              <a:buNone/>
-            </a:pPr>
-            <a:r>
-              <a:rPr lang="en" sz="2000" b="1" dirty="0">
-                <a:solidFill>
-                  <a:srgbClr val="141414"/>
-                </a:solidFill>
-                <a:latin typeface="Space Mono"/>
-                <a:ea typeface="Space Mono"/>
-                <a:cs typeface="Space Mono"/>
-                <a:sym typeface="Space Mono"/>
-              </a:rPr>
-              <a:t>Push</a:t>
-            </a:r>
-            <a:endParaRPr sz="2000" b="1" dirty="0">
-              <a:solidFill>
-                <a:srgbClr val="141414"/>
-              </a:solidFill>
-              <a:latin typeface="Space Mono"/>
-              <a:ea typeface="Space Mono"/>
-              <a:cs typeface="Space Mono"/>
-              <a:sym typeface="Space Mono"/>
-            </a:endParaRPr>
-          </a:p>
-        </p:txBody>
-      </p:sp>
-      <p:sp>
-        <p:nvSpPr>
-          <p:cNvPr id="243" name="Google Shape;243;p33"/>
-          <p:cNvSpPr txBox="1"/>
-          <p:nvPr/>
-        </p:nvSpPr>
-        <p:spPr>
-          <a:xfrm>
-            <a:off x="6654600" y="2562052"/>
-            <a:ext cx="1769400" cy="415200"/>
-          </a:xfrm>
-          <a:prstGeom prst="rect">
-            <a:avLst/>
-          </a:prstGeom>
-          <a:noFill/>
-          <a:ln>
-            <a:noFill/>
-          </a:ln>
-        </p:spPr>
-        <p:txBody>
-          <a:bodyPr spcFirstLastPara="1" wrap="square" lIns="0" tIns="0" rIns="0" bIns="0" anchor="t" anchorCtr="0">
-            <a:noAutofit/>
-          </a:bodyPr>
-          <a:lstStyle/>
-          <a:p>
-            <a:pPr marL="0" lvl="0" indent="0" algn="ctr" rtl="0">
-              <a:lnSpc>
-                <a:spcPct val="90000"/>
-              </a:lnSpc>
-              <a:spcBef>
-                <a:spcPts val="0"/>
-              </a:spcBef>
-              <a:spcAft>
-                <a:spcPts val="0"/>
-              </a:spcAft>
-              <a:buNone/>
-            </a:pPr>
-            <a:r>
-              <a:rPr lang="en" dirty="0">
-                <a:solidFill>
-                  <a:srgbClr val="141414"/>
-                </a:solidFill>
-                <a:latin typeface="Quicksand Medium"/>
-                <a:ea typeface="Quicksand Medium"/>
-                <a:cs typeface="Quicksand Medium"/>
-                <a:sym typeface="Quicksand Medium"/>
-              </a:rPr>
-              <a:t>Pushes changes to local repository to remote repository</a:t>
-            </a:r>
-            <a:endParaRPr dirty="0">
-              <a:solidFill>
-                <a:srgbClr val="141414"/>
-              </a:solidFill>
-              <a:latin typeface="Quicksand Medium"/>
-              <a:ea typeface="Quicksand Medium"/>
-              <a:cs typeface="Quicksand Medium"/>
-              <a:sym typeface="Quicksand Medium"/>
-            </a:endParaRPr>
-          </a:p>
-        </p:txBody>
-      </p:sp>
-      <p:sp>
-        <p:nvSpPr>
           <p:cNvPr id="244" name="Google Shape;244;p33"/>
           <p:cNvSpPr/>
           <p:nvPr/>
@@ -12121,7 +12126,7 @@
                 <a:cs typeface="Quicksand Medium"/>
                 <a:sym typeface="Quicksand Medium"/>
               </a:rPr>
-              <a:t>git commit</a:t>
+              <a:t>git restore</a:t>
             </a:r>
             <a:endParaRPr sz="1600" dirty="0">
               <a:solidFill>
@@ -12194,7 +12199,7 @@
                 <a:cs typeface="Quicksand Medium"/>
                 <a:sym typeface="Quicksand Medium"/>
               </a:rPr>
-              <a:t>it push</a:t>
+              <a:t>it commit</a:t>
             </a:r>
             <a:endParaRPr sz="1600" dirty="0">
               <a:solidFill>
@@ -15049,7 +15054,31 @@
                 <a:cs typeface="Quicksand Medium"/>
                 <a:sym typeface="Quicksand Medium"/>
               </a:rPr>
-              <a:t>Make sure dev is up to date</a:t>
+              <a:t>Make sure </a:t>
+            </a:r>
+            <a:r>
+              <a:rPr lang="en-US" sz="1600" dirty="0" err="1">
+                <a:solidFill>
+                  <a:srgbClr val="141414"/>
+                </a:solidFill>
+                <a:latin typeface="Quicksand Medium"/>
+                <a:ea typeface="Quicksand Medium"/>
+                <a:cs typeface="Quicksand Medium"/>
+                <a:sym typeface="Quicksand Medium"/>
+              </a:rPr>
+              <a:t>dest</a:t>
+            </a:r>
+            <a:r>
+              <a:rPr lang="en-US" sz="1600" dirty="0">
+                <a:solidFill>
+                  <a:srgbClr val="141414"/>
+                </a:solidFill>
+                <a:latin typeface="Quicksand Medium"/>
+                <a:ea typeface="Quicksand Medium"/>
+                <a:cs typeface="Quicksand Medium"/>
+                <a:sym typeface="Quicksand Medium"/>
+              </a:rPr>
+              <a:t> is up to date</a:t>
             </a:r>
             <a:endParaRPr sz="1600" dirty="0">
               <a:solidFill>
@@ -15110,7 +15139,31 @@
                 <a:cs typeface="Quicksand Medium"/>
                 <a:sym typeface="Quicksand Medium"/>
               </a:rPr>
-              <a:t>Merge dev into your feature branch</a:t>
+              <a:t>Merge </a:t>
+            </a:r>
+            <a:r>
+              <a:rPr lang="en-US" sz="1600" dirty="0" err="1">
+                <a:solidFill>
+                  <a:srgbClr val="141414"/>
+                </a:solidFill>
+                <a:latin typeface="Quicksand Medium"/>
+                <a:ea typeface="Quicksand Medium"/>
+                <a:cs typeface="Quicksand Medium"/>
+                <a:sym typeface="Quicksand Medium"/>
+              </a:rPr>
+              <a:t>dest</a:t>
+            </a:r>
+            <a:r>
+              <a:rPr lang="en-US" sz="1600" dirty="0">
+                <a:solidFill>
+                  <a:srgbClr val="141414"/>
+                </a:solidFill>
+                <a:latin typeface="Quicksand Medium"/>
+                <a:ea typeface="Quicksand Medium"/>
+                <a:cs typeface="Quicksand Medium"/>
+                <a:sym typeface="Quicksand Medium"/>
+              </a:rPr>
+              <a:t> into your feature branch</a:t>
             </a:r>
             <a:endParaRPr sz="1600" dirty="0">
               <a:solidFill>
@@ -15232,7 +15285,19 @@
                 <a:cs typeface="Quicksand Medium"/>
                 <a:sym typeface="Quicksand Medium"/>
               </a:rPr>
-              <a:t>Merge feature branch into dev</a:t>
+              <a:t>Merge feature branch into </a:t>
+            </a:r>
+            <a:r>
+              <a:rPr lang="en-US" sz="1600" dirty="0" err="1">
+                <a:solidFill>
+                  <a:srgbClr val="141414"/>
+                </a:solidFill>
+                <a:latin typeface="Quicksand Medium"/>
+                <a:ea typeface="Quicksand Medium"/>
+                <a:cs typeface="Quicksand Medium"/>
+                <a:sym typeface="Quicksand Medium"/>
+              </a:rPr>
+              <a:t>dest</a:t>
             </a:r>
             <a:endParaRPr sz="1600" dirty="0">
               <a:solidFill>

</xml_diff>

<commit_message>
Added pdf with presenter notes
</commit_message>
<xml_diff>
--- a/Basics/GitGud.pptx
+++ b/Basics/GitGud.pptx
@@ -1050,7 +1050,17 @@
             </a:r>
             <a:r>
               <a:rPr lang="en-US" dirty="0"/>
-              <a:t> and a license. It also makes it easy for your clone of this repo to find the remote when making your first commit from your remote.</a:t>
+              <a:t> and a license. It also makes it easy for your clone of this repo to find the remote when making your first commit from your remote. You can then simply clone the remote to make a local copy. </a:t>
+            </a:r>
+            <a:br>
+              <a:rPr lang="en-US" dirty="0"/>
+            </a:br>
+            <a:br>
+              <a:rPr lang="en-US" dirty="0"/>
+            </a:br>
+            <a:r>
+              <a:rPr lang="en-US" dirty="0"/>
+              <a:t>It is also possible to initiate a new repo locally and then set its remote using `git remote add &lt;REPO NAME&gt; &lt;REPO SSH/URL&gt;` . This feels like more work though, and if you want a remote anyway it’s easier to start with making the remote.</a:t>
             </a:r>
             <a:endParaRPr dirty="0"/>
           </a:p>
@@ -1163,7 +1173,7 @@
             </a:pPr>
             <a:r>
               <a:rPr lang="en-US" dirty="0"/>
-              <a:t>Cloning and Forking both create copies of a repository, but with different intents. Forking makes a remote copy, whereas cloning makes a local copy. In a forked repo you can contribute changes without affecting the original, but a clone can’t do this. You can, of course, combine the two.</a:t>
+              <a:t>Cloning and Forking both create copies of a repository, but with different intents. Forking makes a remote copy, whereas cloning makes a local copy. In a forked repo you can contribute changes without affecting the original, but a clone can’t do this. You can, of course, combine the two -&gt; Fork first to make your own remote (unlinked) copy, and then clone to work on the project locally.</a:t>
             </a:r>
             <a:endParaRPr dirty="0"/>
           </a:p>
@@ -1269,7 +1279,79 @@
               </a:spcAft>
               <a:buNone/>
             </a:pPr>
-            <a:endParaRPr/>
+            <a:r>
+              <a:rPr lang="en-US" dirty="0"/>
+              <a:t>git status: Shows tracked files that have changed and new files that aren’t tracked yet</a:t>
+            </a:r>
+            <a:br>
+              <a:rPr lang="en-US" dirty="0"/>
+            </a:br>
+            <a:r>
+              <a:rPr lang="en-US" dirty="0"/>
+              <a:t>Additionally; git diff: Shows changes within files</a:t>
+            </a:r>
+            <a:br>
+              <a:rPr lang="en-US" dirty="0"/>
+            </a:br>
+            <a:br>
+              <a:rPr lang="en-US" dirty="0"/>
+            </a:br>
+            <a:r>
+              <a:rPr lang="en-US" dirty="0"/>
+              <a:t>git add: Allows to add new files to the staging area; can be new files or tracked files that have changed</a:t>
+            </a:r>
+            <a:br>
+              <a:rPr lang="en-US" dirty="0"/>
+            </a:br>
+            <a:r>
+              <a:rPr lang="en-US" dirty="0"/>
+              <a:t>git add has a lot of flags you can use to make using it easier (see next slide), but usually it’s neater to use filenames directly -&gt; `git add &lt;filename1&gt; &lt;filename2&gt;`</a:t>
+            </a:r>
+          </a:p>
+          <a:p>
+            <a:pPr marL="0" lvl="0" indent="0" algn="l" rtl="0">
+              <a:spcBef>
+                <a:spcPts val="0"/>
+              </a:spcBef>
+              <a:spcAft>
+                <a:spcPts val="0"/>
+              </a:spcAft>
+              <a:buNone/>
+            </a:pPr>
+            <a:br>
+              <a:rPr lang="en-US" dirty="0"/>
+            </a:br>
+            <a:r>
+              <a:rPr lang="en-US" dirty="0"/>
+              <a:t>git restore: Allows for removal of staged files from staging area -&gt; `git restore &lt;filename&gt;`</a:t>
+            </a:r>
+            <a:br>
+              <a:rPr lang="en-US" dirty="0"/>
+            </a:br>
+            <a:br>
+              <a:rPr lang="en-US" dirty="0"/>
+            </a:br>
+            <a:r>
+              <a:rPr lang="en-US" dirty="0"/>
+              <a:t>git commit: ‘Saves’ staging area to local repository. Use the –m flag to add a commit message. Another –m can be used for a more detailed description -&gt; `git commit –m “COMMIT MESSAGE” –m “MORE DETAILS”`</a:t>
+            </a:r>
+            <a:br>
+              <a:rPr lang="en-US" dirty="0"/>
+            </a:br>
+            <a:r>
+              <a:rPr lang="en-US" dirty="0"/>
+              <a:t>The first –m is ‘required’ (not adding it opens a text editor to type it instead), the second is optional.</a:t>
+            </a:r>
+            <a:br>
+              <a:rPr lang="en-US" dirty="0"/>
+            </a:br>
+            <a:br>
+              <a:rPr lang="en-US" dirty="0"/>
+            </a:br>
+            <a:r>
+              <a:rPr lang="en-US" dirty="0"/>
+              <a:t>There is also `git push` to push to your remote repo, but this is further explained in the branching segment.</a:t>
+            </a:r>
           </a:p>
         </p:txBody>
       </p:sp>
@@ -1381,6 +1463,31 @@
                 <a:cs typeface="Times New Roman" panose="02020603050405020304" pitchFamily="18" charset="0"/>
               </a:rPr>
               <a:t>https://stackoverflow.com/a/26039014</a:t>
+            </a:r>
+            <a:br>
+              <a:rPr lang="nl-NL" sz="1800" dirty="0">
+                <a:effectLst/>
+                <a:latin typeface="Calibri" panose="020F0502020204030204" pitchFamily="34" charset="0"/>
+                <a:ea typeface="Calibri" panose="020F0502020204030204" pitchFamily="34" charset="0"/>
+                <a:cs typeface="Times New Roman" panose="02020603050405020304" pitchFamily="18" charset="0"/>
+              </a:rPr>
+            </a:br>
+            <a:br>
+              <a:rPr lang="nl-NL" sz="1800" dirty="0">
+                <a:effectLst/>
+                <a:latin typeface="Calibri" panose="020F0502020204030204" pitchFamily="34" charset="0"/>
+                <a:ea typeface="Calibri" panose="020F0502020204030204" pitchFamily="34" charset="0"/>
+                <a:cs typeface="Times New Roman" panose="02020603050405020304" pitchFamily="18" charset="0"/>
+              </a:rPr>
+            </a:br>
+            <a:r>
+              <a:rPr lang="nl-NL" sz="1800" dirty="0">
+                <a:effectLst/>
+                <a:latin typeface="Calibri" panose="020F0502020204030204" pitchFamily="34" charset="0"/>
+                <a:ea typeface="Calibri" panose="020F0502020204030204" pitchFamily="34" charset="0"/>
+                <a:cs typeface="Times New Roman" panose="02020603050405020304" pitchFamily="18" charset="0"/>
+              </a:rPr>
+              <a:t>Using these flags is generally discouraged, but if you DO use them at least make sure you know what they do exactly.</a:t>
             </a:r>
             <a:endParaRPr dirty="0"/>
           </a:p>
@@ -1493,7 +1600,22 @@
             </a:pPr>
             <a:r>
               <a:rPr lang="en-US" dirty="0"/>
-              <a:t>A branch is a copy of the main codebase, where one can introduce changes without changing the main codebase. These are used so developers can work on new features, fixes, etc. without changing the main codebase until whatever is worked on in the branch is complete. Properly using branches prevents merge conflicts.</a:t>
+              <a:t>Branch what/why?</a:t>
+            </a:r>
+          </a:p>
+          <a:p>
+            <a:pPr marL="0" lvl="0" indent="0" algn="l" rtl="0">
+              <a:spcBef>
+                <a:spcPts val="0"/>
+              </a:spcBef>
+              <a:spcAft>
+                <a:spcPts val="0"/>
+              </a:spcAft>
+              <a:buNone/>
+            </a:pPr>
+            <a:r>
+              <a:rPr lang="en-US" dirty="0"/>
+              <a:t>A branch is a copy of the main codebase, where one can introduce changes without changing the main codebase. These are used so developers can work on new features, fixes, etc. in parallel without changing the main codebase until whatever is worked on in the branch is complete. Properly using branches prevents merge conflicts.</a:t>
             </a:r>
             <a:br>
               <a:rPr lang="en-US" dirty="0"/>
@@ -1503,7 +1625,14 @@
             </a:br>
             <a:r>
               <a:rPr lang="en-US" dirty="0"/>
-              <a:t>There are a few different strategies development teams use for branching, but the most common is branching based on features. In this strategy, a team usually starts off with a main branch – this is the release branch. This branch only contains working code. From the main branch a development branch is created – this is where complete code is ‘staged’ until it is ready to be released. From this development branch developers create new branches for each new feature. If an agile project is properly set up, this is very easy to do. </a:t>
+              <a:t>Branching strategies</a:t>
+            </a:r>
+            <a:br>
+              <a:rPr lang="en-US" dirty="0"/>
+            </a:br>
+            <a:r>
+              <a:rPr lang="en-US" dirty="0"/>
+              <a:t>There are a few different strategies development teams use for branching, but the most common is branching based on features. In this strategy, a team usually starts off with a main branch – this is the release branch. This branch only contains working code. From the main branch a development branch is created – this is where complete code is ‘staged’ until it is ready to be released. From this development branch developers create new branches for each new feature, including potential branches for bug fixes etc. If an agile project is properly set up (task division etc.), this is very easy to do. </a:t>
             </a:r>
             <a:br>
               <a:rPr lang="en-US" dirty="0"/>
@@ -1514,6 +1643,21 @@
             <a:r>
               <a:rPr lang="en-US" dirty="0"/>
               <a:t>Branch how?</a:t>
+            </a:r>
+            <a:br>
+              <a:rPr lang="en-US" dirty="0"/>
+            </a:br>
+            <a:r>
+              <a:rPr lang="en-US" dirty="0"/>
+              <a:t>Making new branches or switching to existing branches can be done using the `git checkout` commands. Adding the `-b` flag allows for making a new branch as such; `git checkout –b “</a:t>
+            </a:r>
+            <a:r>
+              <a:rPr lang="en-US" dirty="0" err="1"/>
+              <a:t>new_branch_name</a:t>
+            </a:r>
+            <a:r>
+              <a:rPr lang="en-US" dirty="0"/>
+              <a:t>”` (quotes aren’t necessary, but I use them automatically). If you leave out the –b flag you change to an existing branch instead -&gt; `git checkout “dev”` would switch to the ‘dev’ branch.</a:t>
             </a:r>
             <a:endParaRPr dirty="0"/>
           </a:p>
@@ -1621,7 +1765,55 @@
             </a:pPr>
             <a:r>
               <a:rPr lang="en-US" dirty="0"/>
-              <a:t>Working with branches introduces a few new commands as seen in the slide. Merge has an asterisk, because this one is a little special. The general workflow for merging </a:t>
+              <a:t>Working with branches introduces a few new commands as seen in the slide. Merge has an asterisk, because this one is a little special. The general workflow for merging is explained in the following slide, while this slide explains the commands themself. </a:t>
+            </a:r>
+            <a:br>
+              <a:rPr lang="en-US" dirty="0"/>
+            </a:br>
+            <a:br>
+              <a:rPr lang="en-US" dirty="0"/>
+            </a:br>
+            <a:r>
+              <a:rPr lang="en-US" dirty="0"/>
+              <a:t>`git checkout` is used for switching branches or making a new one. The –b flag allows for making a new, while leaving that flag unchecked switches to a different branch; `git checkout (-b) “</a:t>
+            </a:r>
+            <a:r>
+              <a:rPr lang="en-US" dirty="0" err="1"/>
+              <a:t>branch_name</a:t>
+            </a:r>
+            <a:r>
+              <a:rPr lang="en-US" dirty="0"/>
+              <a:t>”`</a:t>
+            </a:r>
+            <a:br>
+              <a:rPr lang="en-US" dirty="0"/>
+            </a:br>
+            <a:br>
+              <a:rPr lang="en-US" dirty="0"/>
+            </a:br>
+            <a:r>
+              <a:rPr lang="en-US" dirty="0"/>
+              <a:t>`git pull` pulls changes from the remote to your local repository. If you use this in a specific branch only the changes from the remote to that branch are pulled. For example, if the dev branch has been changed but you pull a different feature branch, you don’t pull the changes to the dev branch.</a:t>
+            </a:r>
+            <a:br>
+              <a:rPr lang="en-US" dirty="0"/>
+            </a:br>
+            <a:br>
+              <a:rPr lang="en-US" dirty="0"/>
+            </a:br>
+            <a:r>
+              <a:rPr lang="en-US" dirty="0"/>
+              <a:t>`git push` pushes your local commits to the branch you are in to the corresponding branch on the remote. Similar to pull, this only works for the specific branch you are on.</a:t>
+            </a:r>
+            <a:br>
+              <a:rPr lang="en-US" dirty="0"/>
+            </a:br>
+            <a:br>
+              <a:rPr lang="en-US" dirty="0"/>
+            </a:br>
+            <a:r>
+              <a:rPr lang="en-US" dirty="0"/>
+              <a:t>`git merge “other”` merges ‘other’ into the branch you are currently in. Merging can create merge conflicts, so using it properly requires a merging strategy (as detailed in the next slide)</a:t>
             </a:r>
             <a:endParaRPr dirty="0"/>
           </a:p>
@@ -1734,7 +1926,53 @@
             </a:pPr>
             <a:r>
               <a:rPr lang="en-US" dirty="0"/>
-              <a:t>The general workflow for merging a feature into dev</a:t>
+              <a:t>The general workflow for merging a feature into a </a:t>
+            </a:r>
+            <a:r>
+              <a:rPr lang="en-US" dirty="0" err="1"/>
+              <a:t>dest</a:t>
+            </a:r>
+            <a:r>
+              <a:rPr lang="en-US" dirty="0"/>
+              <a:t>;</a:t>
+            </a:r>
+            <a:br>
+              <a:rPr lang="en-US" dirty="0"/>
+            </a:br>
+            <a:br>
+              <a:rPr lang="en-US" dirty="0"/>
+            </a:br>
+            <a:r>
+              <a:rPr lang="en-US" dirty="0"/>
+              <a:t>First, make sure the branch you want to merge into is up to date by switching to that branch and pulling it.</a:t>
+            </a:r>
+            <a:br>
+              <a:rPr lang="en-US" dirty="0"/>
+            </a:br>
+            <a:r>
+              <a:rPr lang="en-US" dirty="0"/>
+              <a:t>Then move back to the branch you want to merge and merge the destination branch to your current branch.</a:t>
+            </a:r>
+            <a:br>
+              <a:rPr lang="en-US" dirty="0"/>
+            </a:br>
+            <a:r>
+              <a:rPr lang="en-US" dirty="0"/>
+              <a:t>If merge conflicts arise, fix them and repeat from the top.</a:t>
+            </a:r>
+            <a:br>
+              <a:rPr lang="en-US" dirty="0"/>
+            </a:br>
+            <a:r>
+              <a:rPr lang="en-US" dirty="0"/>
+              <a:t>If no merge conflicts arise (anymore), you can push your local changes</a:t>
+            </a:r>
+            <a:br>
+              <a:rPr lang="en-US" dirty="0"/>
+            </a:br>
+            <a:r>
+              <a:rPr lang="en-US" dirty="0"/>
+              <a:t>Switch to your destination folder and merge the branch you want to merge into destination, push changes.</a:t>
             </a:r>
             <a:endParaRPr dirty="0"/>
           </a:p>
@@ -2551,7 +2789,14 @@
             </a:pPr>
             <a:r>
               <a:rPr lang="en-US" dirty="0"/>
-              <a:t>VCS is an abbreviation for Version Control System. A VCS is a tool that saves the changes to files in a local and/or remote repository. The benefit of using a VCS is the clear development history – at any point in time it is possible to see who did what and what happened since then. This clear development history makes it easier to locate bugs and roll back to stable versions. Are there any alternatives to using a VCS? Not really – one could use local backups on (removable) hard drives, but this makes working together much harder. </a:t>
+              <a:t>VCS is an abbreviation for Version Control System. A VCS is a tool that saves the changes to files in a local and/or remote repository. The benefit of using a VCS is the clear development history – at any point in time it is possible to see who did what and what happened since then. This clear development history makes it easier to locate bugs and roll back to stable versions. </a:t>
+            </a:r>
+            <a:br>
+              <a:rPr lang="en-US" dirty="0"/>
+            </a:br>
+            <a:r>
+              <a:rPr lang="en-US" dirty="0"/>
+              <a:t>Are there any alternatives to using a VCS? Not really – one could use local backups on (removable) hard drives, but this makes working together much harder. </a:t>
             </a:r>
             <a:endParaRPr dirty="0"/>
           </a:p>
@@ -2659,15 +2904,7 @@
             </a:pPr>
             <a:r>
               <a:rPr lang="en-US" dirty="0"/>
-              <a:t>Git is the most popular VCS worldwide, mostly because of it’s ease of use and speed – because you work locally your not as limited by network speed, there is no single point of failure as with SVN and git is available offline. In comparison to Mercurial and SVN, About 80-90% of developers (according to </a:t>
-            </a:r>
-            <a:r>
-              <a:rPr lang="en-US" dirty="0" err="1"/>
-              <a:t>Linkedin</a:t>
-            </a:r>
-            <a:r>
-              <a:rPr lang="en-US" dirty="0"/>
-              <a:t>, Stack Overflow surveys) use Git in their work. </a:t>
+              <a:t>Git is the most popular VCS worldwide, mostly because of its ease of use and speed – because you work locally you’re not as limited by network speed, there is no single point of failure as with centralized VCS(SVN) and git is available offline.</a:t>
             </a:r>
             <a:br>
               <a:rPr lang="en-US" dirty="0"/>
@@ -2677,7 +2914,7 @@
             </a:br>
             <a:r>
               <a:rPr lang="en-US" dirty="0"/>
-              <a:t>Alternatives to Git include Mercurial and SVN, but only about 16.1% of developers use SVN, and only 3.6% use Mercurial</a:t>
+              <a:t>Alternatives to Git include Mercurial and SVN, but only about 16.1% of developers use SVN, and only 3.6% use Mercurial while 80-90% of developers use Git: https://insights.stackoverflow.com/survey/2021#most-loved-dreaded-and-wanted-tools-tech-love-dread</a:t>
             </a:r>
             <a:br>
               <a:rPr lang="en-US" dirty="0"/>
@@ -2687,8 +2924,14 @@
             </a:br>
             <a:r>
               <a:rPr lang="en-US" dirty="0"/>
-              <a:t>https://insights.stackoverflow.com/survey/2021#most-loved-dreaded-and-wanted-tools-tech-love-dread</a:t>
-            </a:r>
+              <a:t>Git is a distributed VCS, meaning that you always have a working local repository in addition to a central remote. Centralized VCS only have a remote, so any ‘commits’ you make are sent directly to the remote. </a:t>
+            </a:r>
+            <a:br>
+              <a:rPr lang="en-US" dirty="0"/>
+            </a:br>
+            <a:br>
+              <a:rPr lang="en-US" dirty="0"/>
+            </a:br>
             <a:endParaRPr dirty="0"/>
           </a:p>
         </p:txBody>
@@ -3032,15 +3275,41 @@
             </a:br>
             <a:r>
               <a:rPr lang="en-US" dirty="0"/>
-              <a:t>Problems with IDE/GUI; they may be linked to specific languages (</a:t>
+              <a:t>Problems with IDE/GUI; they may be linked to specific languages (JetBrains), may not always be available (problems with software), unknown what actually happens when using these tools. As a software developer it’s important to select the right tools for the job, but Git through command line is always a good tool to have.</a:t>
+            </a:r>
+            <a:br>
+              <a:rPr lang="en-US" dirty="0"/>
+            </a:br>
+            <a:br>
+              <a:rPr lang="en-US" dirty="0"/>
+            </a:br>
+            <a:r>
+              <a:rPr lang="en-US" dirty="0"/>
+              <a:t>Example; 1</a:t>
+            </a:r>
+            <a:r>
+              <a:rPr lang="en-US" baseline="30000" dirty="0"/>
+              <a:t>st</a:t>
+            </a:r>
+            <a:r>
+              <a:rPr lang="en-US" dirty="0"/>
+              <a:t> year students have learned to use Git through JetBrains IDEs, but not manually. For a project they did they had to work with the Arduino IDE, which does not have a native git integration. They said they kept </a:t>
             </a:r>
             <a:r>
               <a:rPr lang="en-US" dirty="0" err="1"/>
-              <a:t>jetbrains</a:t>
+              <a:t>copy+pasting</a:t>
             </a:r>
             <a:r>
               <a:rPr lang="en-US" dirty="0"/>
-              <a:t>), may not always be available (problems with software), unknown what actually happens when using these tools. As a software developer it’s important to select the right tools for the job, but Git through command line is always a good tool to have</a:t>
+              <a:t> code from Arduino IDE to </a:t>
+            </a:r>
+            <a:r>
+              <a:rPr lang="en-US" dirty="0" err="1"/>
+              <a:t>Clion</a:t>
+            </a:r>
+            <a:r>
+              <a:rPr lang="en-US" dirty="0"/>
+              <a:t> in order to use the Git integration.</a:t>
             </a:r>
             <a:endParaRPr dirty="0"/>
           </a:p>
@@ -10728,6 +10997,21 @@
               <a:rPr lang="en-US" dirty="0"/>
               <a:t>, license</a:t>
             </a:r>
+          </a:p>
+          <a:p>
+            <a:pPr marL="0" lvl="0" indent="0" algn="l" rtl="0">
+              <a:spcBef>
+                <a:spcPts val="0"/>
+              </a:spcBef>
+              <a:spcAft>
+                <a:spcPts val="0"/>
+              </a:spcAft>
+              <a:buNone/>
+            </a:pPr>
+            <a:r>
+              <a:rPr lang="en-US" dirty="0"/>
+              <a:t>	&gt; Simply clone for a local copy</a:t>
+            </a:r>
             <a:br>
               <a:rPr lang="en-US" dirty="0"/>
             </a:br>
@@ -14744,7 +15028,7 @@
                 <a:cs typeface="Quicksand Medium"/>
                 <a:sym typeface="Quicksand Medium"/>
               </a:rPr>
-              <a:t>Fix merge conflicts, repeat step 2 if conflicts occurred</a:t>
+              <a:t>Fix merge conflicts, repeat step 1+2 if conflicts occurred</a:t>
             </a:r>
           </a:p>
         </p:txBody>

</xml_diff>